<commit_message>
Minor enhancements in DG (1st Draft)
</commit_message>
<xml_diff>
--- a/docs/diagrams/UiMockUp.pptx
+++ b/docs/diagrams/UiMockUp.pptx
@@ -7,6 +7,8 @@
   <p:sldIdLst>
     <p:sldId id="256" r:id="rId2"/>
     <p:sldId id="257" r:id="rId3"/>
+    <p:sldId id="258" r:id="rId4"/>
+    <p:sldId id="259" r:id="rId5"/>
   </p:sldIdLst>
   <p:sldSz cx="12192000" cy="6858000"/>
   <p:notesSz cx="6858000" cy="9144000"/>
@@ -262,7 +264,7 @@
           <a:p>
             <a:fld id="{181FA2F3-BF46-4223-8368-B788E003980A}" type="datetimeFigureOut">
               <a:rPr lang="en-SG" smtClean="0"/>
-              <a:t>14/3/2018</a:t>
+              <a:t>20/3/2018</a:t>
             </a:fld>
             <a:endParaRPr lang="en-SG"/>
           </a:p>
@@ -462,7 +464,7 @@
           <a:p>
             <a:fld id="{181FA2F3-BF46-4223-8368-B788E003980A}" type="datetimeFigureOut">
               <a:rPr lang="en-SG" smtClean="0"/>
-              <a:t>14/3/2018</a:t>
+              <a:t>20/3/2018</a:t>
             </a:fld>
             <a:endParaRPr lang="en-SG"/>
           </a:p>
@@ -672,7 +674,7 @@
           <a:p>
             <a:fld id="{181FA2F3-BF46-4223-8368-B788E003980A}" type="datetimeFigureOut">
               <a:rPr lang="en-SG" smtClean="0"/>
-              <a:t>14/3/2018</a:t>
+              <a:t>20/3/2018</a:t>
             </a:fld>
             <a:endParaRPr lang="en-SG"/>
           </a:p>
@@ -872,7 +874,7 @@
           <a:p>
             <a:fld id="{181FA2F3-BF46-4223-8368-B788E003980A}" type="datetimeFigureOut">
               <a:rPr lang="en-SG" smtClean="0"/>
-              <a:t>14/3/2018</a:t>
+              <a:t>20/3/2018</a:t>
             </a:fld>
             <a:endParaRPr lang="en-SG"/>
           </a:p>
@@ -1148,7 +1150,7 @@
           <a:p>
             <a:fld id="{181FA2F3-BF46-4223-8368-B788E003980A}" type="datetimeFigureOut">
               <a:rPr lang="en-SG" smtClean="0"/>
-              <a:t>14/3/2018</a:t>
+              <a:t>20/3/2018</a:t>
             </a:fld>
             <a:endParaRPr lang="en-SG"/>
           </a:p>
@@ -1416,7 +1418,7 @@
           <a:p>
             <a:fld id="{181FA2F3-BF46-4223-8368-B788E003980A}" type="datetimeFigureOut">
               <a:rPr lang="en-SG" smtClean="0"/>
-              <a:t>14/3/2018</a:t>
+              <a:t>20/3/2018</a:t>
             </a:fld>
             <a:endParaRPr lang="en-SG"/>
           </a:p>
@@ -1831,7 +1833,7 @@
           <a:p>
             <a:fld id="{181FA2F3-BF46-4223-8368-B788E003980A}" type="datetimeFigureOut">
               <a:rPr lang="en-SG" smtClean="0"/>
-              <a:t>14/3/2018</a:t>
+              <a:t>20/3/2018</a:t>
             </a:fld>
             <a:endParaRPr lang="en-SG"/>
           </a:p>
@@ -1973,7 +1975,7 @@
           <a:p>
             <a:fld id="{181FA2F3-BF46-4223-8368-B788E003980A}" type="datetimeFigureOut">
               <a:rPr lang="en-SG" smtClean="0"/>
-              <a:t>14/3/2018</a:t>
+              <a:t>20/3/2018</a:t>
             </a:fld>
             <a:endParaRPr lang="en-SG"/>
           </a:p>
@@ -2086,7 +2088,7 @@
           <a:p>
             <a:fld id="{181FA2F3-BF46-4223-8368-B788E003980A}" type="datetimeFigureOut">
               <a:rPr lang="en-SG" smtClean="0"/>
-              <a:t>14/3/2018</a:t>
+              <a:t>20/3/2018</a:t>
             </a:fld>
             <a:endParaRPr lang="en-SG"/>
           </a:p>
@@ -2399,7 +2401,7 @@
           <a:p>
             <a:fld id="{181FA2F3-BF46-4223-8368-B788E003980A}" type="datetimeFigureOut">
               <a:rPr lang="en-SG" smtClean="0"/>
-              <a:t>14/3/2018</a:t>
+              <a:t>20/3/2018</a:t>
             </a:fld>
             <a:endParaRPr lang="en-SG"/>
           </a:p>
@@ -2688,7 +2690,7 @@
           <a:p>
             <a:fld id="{181FA2F3-BF46-4223-8368-B788E003980A}" type="datetimeFigureOut">
               <a:rPr lang="en-SG" smtClean="0"/>
-              <a:t>14/3/2018</a:t>
+              <a:t>20/3/2018</a:t>
             </a:fld>
             <a:endParaRPr lang="en-SG"/>
           </a:p>
@@ -2931,7 +2933,7 @@
           <a:p>
             <a:fld id="{181FA2F3-BF46-4223-8368-B788E003980A}" type="datetimeFigureOut">
               <a:rPr lang="en-SG" smtClean="0"/>
-              <a:t>14/3/2018</a:t>
+              <a:t>20/3/2018</a:t>
             </a:fld>
             <a:endParaRPr lang="en-SG"/>
           </a:p>
@@ -6440,6 +6442,480 @@
 </p:sld>
 </file>
 
+<file path=ppt/slides/slide3.xml><?xml version="1.0" encoding="utf-8"?>
+<p:sld xmlns:a="http://schemas.openxmlformats.org/drawingml/2006/main" xmlns:r="http://schemas.openxmlformats.org/officeDocument/2006/relationships" xmlns:p="http://schemas.openxmlformats.org/presentationml/2006/main">
+  <p:cSld>
+    <p:spTree>
+      <p:nvGrpSpPr>
+        <p:cNvPr id="1" name=""/>
+        <p:cNvGrpSpPr/>
+        <p:nvPr/>
+      </p:nvGrpSpPr>
+      <p:grpSpPr>
+        <a:xfrm>
+          <a:off x="0" y="0"/>
+          <a:ext cx="0" cy="0"/>
+          <a:chOff x="0" y="0"/>
+          <a:chExt cx="0" cy="0"/>
+        </a:xfrm>
+      </p:grpSpPr>
+      <p:grpSp>
+        <p:nvGrpSpPr>
+          <p:cNvPr id="11" name="Group 10">
+            <a:extLst>
+              <a:ext uri="{FF2B5EF4-FFF2-40B4-BE49-F238E27FC236}">
+                <a16:creationId xmlns:a16="http://schemas.microsoft.com/office/drawing/2014/main" id="{36AB33D8-25C3-490E-AA36-D33C43359980}"/>
+              </a:ext>
+            </a:extLst>
+          </p:cNvPr>
+          <p:cNvGrpSpPr/>
+          <p:nvPr/>
+        </p:nvGrpSpPr>
+        <p:grpSpPr>
+          <a:xfrm>
+            <a:off x="378056" y="1863491"/>
+            <a:ext cx="11435888" cy="3618616"/>
+            <a:chOff x="378056" y="1863491"/>
+            <a:chExt cx="11435888" cy="3618616"/>
+          </a:xfrm>
+        </p:grpSpPr>
+        <p:pic>
+          <p:nvPicPr>
+            <p:cNvPr id="5" name="Picture 4">
+              <a:extLst>
+                <a:ext uri="{FF2B5EF4-FFF2-40B4-BE49-F238E27FC236}">
+                  <a16:creationId xmlns:a16="http://schemas.microsoft.com/office/drawing/2014/main" id="{CD3CB975-CC63-484E-8384-BD7344451C0B}"/>
+                </a:ext>
+              </a:extLst>
+            </p:cNvPr>
+            <p:cNvPicPr>
+              <a:picLocks noChangeAspect="1"/>
+            </p:cNvPicPr>
+            <p:nvPr/>
+          </p:nvPicPr>
+          <p:blipFill rotWithShape="1">
+            <a:blip r:embed="rId2">
+              <a:extLst>
+                <a:ext uri="{28A0092B-C50C-407E-A947-70E740481C1C}">
+                  <a14:useLocalDpi xmlns:a14="http://schemas.microsoft.com/office/drawing/2010/main" val="0"/>
+                </a:ext>
+              </a:extLst>
+            </a:blip>
+            <a:srcRect l="26185" t="30524" r="21115" b="5245"/>
+            <a:stretch/>
+          </p:blipFill>
+          <p:spPr>
+            <a:xfrm>
+              <a:off x="6968856" y="1863491"/>
+              <a:ext cx="4845088" cy="3131017"/>
+            </a:xfrm>
+            <a:prstGeom prst="rect">
+              <a:avLst/>
+            </a:prstGeom>
+          </p:spPr>
+        </p:pic>
+        <p:pic>
+          <p:nvPicPr>
+            <p:cNvPr id="7" name="Picture 6">
+              <a:extLst>
+                <a:ext uri="{FF2B5EF4-FFF2-40B4-BE49-F238E27FC236}">
+                  <a16:creationId xmlns:a16="http://schemas.microsoft.com/office/drawing/2014/main" id="{70234426-9A2F-477B-909C-36C40024ED6D}"/>
+                </a:ext>
+              </a:extLst>
+            </p:cNvPr>
+            <p:cNvPicPr>
+              <a:picLocks noChangeAspect="1"/>
+            </p:cNvPicPr>
+            <p:nvPr/>
+          </p:nvPicPr>
+          <p:blipFill rotWithShape="1">
+            <a:blip r:embed="rId3">
+              <a:extLst>
+                <a:ext uri="{28A0092B-C50C-407E-A947-70E740481C1C}">
+                  <a14:useLocalDpi xmlns:a14="http://schemas.microsoft.com/office/drawing/2010/main" val="0"/>
+                </a:ext>
+              </a:extLst>
+            </a:blip>
+            <a:srcRect l="27861" t="28510" b="5182"/>
+            <a:stretch/>
+          </p:blipFill>
+          <p:spPr>
+            <a:xfrm>
+              <a:off x="378056" y="1863491"/>
+              <a:ext cx="4845088" cy="3131016"/>
+            </a:xfrm>
+            <a:prstGeom prst="rect">
+              <a:avLst/>
+            </a:prstGeom>
+          </p:spPr>
+        </p:pic>
+        <p:sp>
+          <p:nvSpPr>
+            <p:cNvPr id="8" name="Arrow: Right 7">
+              <a:extLst>
+                <a:ext uri="{FF2B5EF4-FFF2-40B4-BE49-F238E27FC236}">
+                  <a16:creationId xmlns:a16="http://schemas.microsoft.com/office/drawing/2014/main" id="{2480BFCD-BA18-4F40-98AF-DC279BFA8ABB}"/>
+                </a:ext>
+              </a:extLst>
+            </p:cNvPr>
+            <p:cNvSpPr/>
+            <p:nvPr/>
+          </p:nvSpPr>
+          <p:spPr>
+            <a:xfrm>
+              <a:off x="5437238" y="2957050"/>
+              <a:ext cx="1179871" cy="943897"/>
+            </a:xfrm>
+            <a:prstGeom prst="rightArrow">
+              <a:avLst/>
+            </a:prstGeom>
+          </p:spPr>
+          <p:style>
+            <a:lnRef idx="2">
+              <a:schemeClr val="accent1">
+                <a:shade val="50000"/>
+              </a:schemeClr>
+            </a:lnRef>
+            <a:fillRef idx="1">
+              <a:schemeClr val="accent1"/>
+            </a:fillRef>
+            <a:effectRef idx="0">
+              <a:schemeClr val="accent1"/>
+            </a:effectRef>
+            <a:fontRef idx="minor">
+              <a:schemeClr val="lt1"/>
+            </a:fontRef>
+          </p:style>
+          <p:txBody>
+            <a:bodyPr rtlCol="0" anchor="ctr"/>
+            <a:lstStyle/>
+            <a:p>
+              <a:pPr algn="ctr"/>
+              <a:endParaRPr lang="en-SG"/>
+            </a:p>
+          </p:txBody>
+        </p:sp>
+        <p:sp>
+          <p:nvSpPr>
+            <p:cNvPr id="9" name="TextBox 8">
+              <a:extLst>
+                <a:ext uri="{FF2B5EF4-FFF2-40B4-BE49-F238E27FC236}">
+                  <a16:creationId xmlns:a16="http://schemas.microsoft.com/office/drawing/2014/main" id="{723DD81A-8E68-4E10-B1AD-33BE48BA193D}"/>
+                </a:ext>
+              </a:extLst>
+            </p:cNvPr>
+            <p:cNvSpPr txBox="1"/>
+            <p:nvPr/>
+          </p:nvSpPr>
+          <p:spPr>
+            <a:xfrm>
+              <a:off x="1838631" y="5112775"/>
+              <a:ext cx="2123768" cy="369332"/>
+            </a:xfrm>
+            <a:prstGeom prst="rect">
+              <a:avLst/>
+            </a:prstGeom>
+            <a:noFill/>
+          </p:spPr>
+          <p:txBody>
+            <a:bodyPr wrap="square" rtlCol="0">
+              <a:spAutoFit/>
+            </a:bodyPr>
+            <a:lstStyle/>
+            <a:p>
+              <a:r>
+                <a:rPr lang="en-SG" dirty="0"/>
+                <a:t>Original Version</a:t>
+              </a:r>
+            </a:p>
+          </p:txBody>
+        </p:sp>
+        <p:sp>
+          <p:nvSpPr>
+            <p:cNvPr id="10" name="TextBox 9">
+              <a:extLst>
+                <a:ext uri="{FF2B5EF4-FFF2-40B4-BE49-F238E27FC236}">
+                  <a16:creationId xmlns:a16="http://schemas.microsoft.com/office/drawing/2014/main" id="{0BEC037D-6679-4748-9F83-DF80D38BDD56}"/>
+                </a:ext>
+              </a:extLst>
+            </p:cNvPr>
+            <p:cNvSpPr txBox="1"/>
+            <p:nvPr/>
+          </p:nvSpPr>
+          <p:spPr>
+            <a:xfrm>
+              <a:off x="8608140" y="5112775"/>
+              <a:ext cx="2123768" cy="369332"/>
+            </a:xfrm>
+            <a:prstGeom prst="rect">
+              <a:avLst/>
+            </a:prstGeom>
+            <a:noFill/>
+          </p:spPr>
+          <p:txBody>
+            <a:bodyPr wrap="square" rtlCol="0">
+              <a:spAutoFit/>
+            </a:bodyPr>
+            <a:lstStyle/>
+            <a:p>
+              <a:r>
+                <a:rPr lang="en-SG" dirty="0"/>
+                <a:t>Modified Version</a:t>
+              </a:r>
+            </a:p>
+          </p:txBody>
+        </p:sp>
+      </p:grpSp>
+    </p:spTree>
+    <p:extLst>
+      <p:ext uri="{BB962C8B-B14F-4D97-AF65-F5344CB8AC3E}">
+        <p14:creationId xmlns:p14="http://schemas.microsoft.com/office/powerpoint/2010/main" val="1271228418"/>
+      </p:ext>
+    </p:extLst>
+  </p:cSld>
+  <p:clrMapOvr>
+    <a:masterClrMapping/>
+  </p:clrMapOvr>
+</p:sld>
+</file>
+
+<file path=ppt/slides/slide4.xml><?xml version="1.0" encoding="utf-8"?>
+<p:sld xmlns:a="http://schemas.openxmlformats.org/drawingml/2006/main" xmlns:r="http://schemas.openxmlformats.org/officeDocument/2006/relationships" xmlns:p="http://schemas.openxmlformats.org/presentationml/2006/main">
+  <p:cSld>
+    <p:spTree>
+      <p:nvGrpSpPr>
+        <p:cNvPr id="1" name=""/>
+        <p:cNvGrpSpPr/>
+        <p:nvPr/>
+      </p:nvGrpSpPr>
+      <p:grpSpPr>
+        <a:xfrm>
+          <a:off x="0" y="0"/>
+          <a:ext cx="0" cy="0"/>
+          <a:chOff x="0" y="0"/>
+          <a:chExt cx="0" cy="0"/>
+        </a:xfrm>
+      </p:grpSpPr>
+      <p:grpSp>
+        <p:nvGrpSpPr>
+          <p:cNvPr id="2" name="Group 1">
+            <a:extLst>
+              <a:ext uri="{FF2B5EF4-FFF2-40B4-BE49-F238E27FC236}">
+                <a16:creationId xmlns:a16="http://schemas.microsoft.com/office/drawing/2014/main" id="{BE2423CA-6B80-4781-A4D7-F6FBECA67029}"/>
+              </a:ext>
+            </a:extLst>
+          </p:cNvPr>
+          <p:cNvGrpSpPr/>
+          <p:nvPr/>
+        </p:nvGrpSpPr>
+        <p:grpSpPr>
+          <a:xfrm>
+            <a:off x="1649690" y="2083457"/>
+            <a:ext cx="8493551" cy="3058514"/>
+            <a:chOff x="1715678" y="2102311"/>
+            <a:chExt cx="8493551" cy="3058514"/>
+          </a:xfrm>
+        </p:grpSpPr>
+        <p:pic>
+          <p:nvPicPr>
+            <p:cNvPr id="5" name="Picture 4">
+              <a:extLst>
+                <a:ext uri="{FF2B5EF4-FFF2-40B4-BE49-F238E27FC236}">
+                  <a16:creationId xmlns:a16="http://schemas.microsoft.com/office/drawing/2014/main" id="{CD3CB975-CC63-484E-8384-BD7344451C0B}"/>
+                </a:ext>
+              </a:extLst>
+            </p:cNvPr>
+            <p:cNvPicPr>
+              <a:picLocks noChangeAspect="1"/>
+            </p:cNvPicPr>
+            <p:nvPr/>
+          </p:nvPicPr>
+          <p:blipFill rotWithShape="1">
+            <a:blip r:embed="rId2">
+              <a:extLst>
+                <a:ext uri="{28A0092B-C50C-407E-A947-70E740481C1C}">
+                  <a14:useLocalDpi xmlns:a14="http://schemas.microsoft.com/office/drawing/2010/main" val="0"/>
+                </a:ext>
+              </a:extLst>
+            </a:blip>
+            <a:srcRect l="-44" t="32624" r="73374" b="28297"/>
+            <a:stretch/>
+          </p:blipFill>
+          <p:spPr>
+            <a:xfrm>
+              <a:off x="6928702" y="2102311"/>
+              <a:ext cx="3280527" cy="2548529"/>
+            </a:xfrm>
+            <a:prstGeom prst="rect">
+              <a:avLst/>
+            </a:prstGeom>
+          </p:spPr>
+        </p:pic>
+        <p:pic>
+          <p:nvPicPr>
+            <p:cNvPr id="7" name="Picture 6">
+              <a:extLst>
+                <a:ext uri="{FF2B5EF4-FFF2-40B4-BE49-F238E27FC236}">
+                  <a16:creationId xmlns:a16="http://schemas.microsoft.com/office/drawing/2014/main" id="{70234426-9A2F-477B-909C-36C40024ED6D}"/>
+                </a:ext>
+              </a:extLst>
+            </p:cNvPr>
+            <p:cNvPicPr>
+              <a:picLocks noChangeAspect="1"/>
+            </p:cNvPicPr>
+            <p:nvPr/>
+          </p:nvPicPr>
+          <p:blipFill rotWithShape="1">
+            <a:blip r:embed="rId3">
+              <a:extLst>
+                <a:ext uri="{28A0092B-C50C-407E-A947-70E740481C1C}">
+                  <a14:useLocalDpi xmlns:a14="http://schemas.microsoft.com/office/drawing/2010/main" val="0"/>
+                </a:ext>
+              </a:extLst>
+            </a:blip>
+            <a:srcRect t="28765" r="72837" b="41516"/>
+            <a:stretch/>
+          </p:blipFill>
+          <p:spPr>
+            <a:xfrm>
+              <a:off x="1715678" y="2102311"/>
+              <a:ext cx="3280527" cy="2548528"/>
+            </a:xfrm>
+            <a:prstGeom prst="rect">
+              <a:avLst/>
+            </a:prstGeom>
+          </p:spPr>
+        </p:pic>
+        <p:sp>
+          <p:nvSpPr>
+            <p:cNvPr id="8" name="Arrow: Right 7">
+              <a:extLst>
+                <a:ext uri="{FF2B5EF4-FFF2-40B4-BE49-F238E27FC236}">
+                  <a16:creationId xmlns:a16="http://schemas.microsoft.com/office/drawing/2014/main" id="{2480BFCD-BA18-4F40-98AF-DC279BFA8ABB}"/>
+                </a:ext>
+              </a:extLst>
+            </p:cNvPr>
+            <p:cNvSpPr/>
+            <p:nvPr/>
+          </p:nvSpPr>
+          <p:spPr>
+            <a:xfrm>
+              <a:off x="5506064" y="2957051"/>
+              <a:ext cx="1179871" cy="943897"/>
+            </a:xfrm>
+            <a:prstGeom prst="rightArrow">
+              <a:avLst/>
+            </a:prstGeom>
+          </p:spPr>
+          <p:style>
+            <a:lnRef idx="2">
+              <a:schemeClr val="accent1">
+                <a:shade val="50000"/>
+              </a:schemeClr>
+            </a:lnRef>
+            <a:fillRef idx="1">
+              <a:schemeClr val="accent1"/>
+            </a:fillRef>
+            <a:effectRef idx="0">
+              <a:schemeClr val="accent1"/>
+            </a:effectRef>
+            <a:fontRef idx="minor">
+              <a:schemeClr val="lt1"/>
+            </a:fontRef>
+          </p:style>
+          <p:txBody>
+            <a:bodyPr rtlCol="0" anchor="ctr"/>
+            <a:lstStyle/>
+            <a:p>
+              <a:pPr algn="ctr"/>
+              <a:endParaRPr lang="en-SG"/>
+            </a:p>
+          </p:txBody>
+        </p:sp>
+        <p:sp>
+          <p:nvSpPr>
+            <p:cNvPr id="9" name="TextBox 8">
+              <a:extLst>
+                <a:ext uri="{FF2B5EF4-FFF2-40B4-BE49-F238E27FC236}">
+                  <a16:creationId xmlns:a16="http://schemas.microsoft.com/office/drawing/2014/main" id="{723DD81A-8E68-4E10-B1AD-33BE48BA193D}"/>
+                </a:ext>
+              </a:extLst>
+            </p:cNvPr>
+            <p:cNvSpPr txBox="1"/>
+            <p:nvPr/>
+          </p:nvSpPr>
+          <p:spPr>
+            <a:xfrm>
+              <a:off x="2375959" y="4775171"/>
+              <a:ext cx="2123768" cy="369332"/>
+            </a:xfrm>
+            <a:prstGeom prst="rect">
+              <a:avLst/>
+            </a:prstGeom>
+            <a:noFill/>
+          </p:spPr>
+          <p:txBody>
+            <a:bodyPr wrap="square" rtlCol="0">
+              <a:spAutoFit/>
+            </a:bodyPr>
+            <a:lstStyle/>
+            <a:p>
+              <a:r>
+                <a:rPr lang="en-SG" dirty="0"/>
+                <a:t>Original Version</a:t>
+              </a:r>
+            </a:p>
+          </p:txBody>
+        </p:sp>
+        <p:sp>
+          <p:nvSpPr>
+            <p:cNvPr id="10" name="TextBox 9">
+              <a:extLst>
+                <a:ext uri="{FF2B5EF4-FFF2-40B4-BE49-F238E27FC236}">
+                  <a16:creationId xmlns:a16="http://schemas.microsoft.com/office/drawing/2014/main" id="{0BEC037D-6679-4748-9F83-DF80D38BDD56}"/>
+                </a:ext>
+              </a:extLst>
+            </p:cNvPr>
+            <p:cNvSpPr txBox="1"/>
+            <p:nvPr/>
+          </p:nvSpPr>
+          <p:spPr>
+            <a:xfrm>
+              <a:off x="7778582" y="4791493"/>
+              <a:ext cx="2123768" cy="369332"/>
+            </a:xfrm>
+            <a:prstGeom prst="rect">
+              <a:avLst/>
+            </a:prstGeom>
+            <a:noFill/>
+          </p:spPr>
+          <p:txBody>
+            <a:bodyPr wrap="square" rtlCol="0">
+              <a:spAutoFit/>
+            </a:bodyPr>
+            <a:lstStyle/>
+            <a:p>
+              <a:r>
+                <a:rPr lang="en-SG" dirty="0"/>
+                <a:t>Improved Version</a:t>
+              </a:r>
+            </a:p>
+          </p:txBody>
+        </p:sp>
+      </p:grpSp>
+    </p:spTree>
+    <p:extLst>
+      <p:ext uri="{BB962C8B-B14F-4D97-AF65-F5344CB8AC3E}">
+        <p14:creationId xmlns:p14="http://schemas.microsoft.com/office/powerpoint/2010/main" val="118191816"/>
+      </p:ext>
+    </p:extLst>
+  </p:cSld>
+  <p:clrMapOvr>
+    <a:masterClrMapping/>
+  </p:clrMapOvr>
+</p:sld>
+</file>
+
 <file path=ppt/theme/theme1.xml><?xml version="1.0" encoding="utf-8"?>
 <a:theme xmlns:a="http://schemas.openxmlformats.org/drawingml/2006/main" name="Office Theme">
   <a:themeElements>

</xml_diff>

<commit_message>
More updates to minor enhancement
</commit_message>
<xml_diff>
--- a/docs/diagrams/UiMockUp.pptx
+++ b/docs/diagrams/UiMockUp.pptx
@@ -7,8 +7,6 @@
   <p:sldIdLst>
     <p:sldId id="256" r:id="rId2"/>
     <p:sldId id="257" r:id="rId3"/>
-    <p:sldId id="258" r:id="rId4"/>
-    <p:sldId id="259" r:id="rId5"/>
   </p:sldIdLst>
   <p:sldSz cx="12192000" cy="6858000"/>
   <p:notesSz cx="6858000" cy="9144000"/>
@@ -6442,480 +6440,6 @@
 </p:sld>
 </file>
 
-<file path=ppt/slides/slide3.xml><?xml version="1.0" encoding="utf-8"?>
-<p:sld xmlns:a="http://schemas.openxmlformats.org/drawingml/2006/main" xmlns:r="http://schemas.openxmlformats.org/officeDocument/2006/relationships" xmlns:p="http://schemas.openxmlformats.org/presentationml/2006/main">
-  <p:cSld>
-    <p:spTree>
-      <p:nvGrpSpPr>
-        <p:cNvPr id="1" name=""/>
-        <p:cNvGrpSpPr/>
-        <p:nvPr/>
-      </p:nvGrpSpPr>
-      <p:grpSpPr>
-        <a:xfrm>
-          <a:off x="0" y="0"/>
-          <a:ext cx="0" cy="0"/>
-          <a:chOff x="0" y="0"/>
-          <a:chExt cx="0" cy="0"/>
-        </a:xfrm>
-      </p:grpSpPr>
-      <p:grpSp>
-        <p:nvGrpSpPr>
-          <p:cNvPr id="11" name="Group 10">
-            <a:extLst>
-              <a:ext uri="{FF2B5EF4-FFF2-40B4-BE49-F238E27FC236}">
-                <a16:creationId xmlns:a16="http://schemas.microsoft.com/office/drawing/2014/main" id="{36AB33D8-25C3-490E-AA36-D33C43359980}"/>
-              </a:ext>
-            </a:extLst>
-          </p:cNvPr>
-          <p:cNvGrpSpPr/>
-          <p:nvPr/>
-        </p:nvGrpSpPr>
-        <p:grpSpPr>
-          <a:xfrm>
-            <a:off x="378056" y="1863491"/>
-            <a:ext cx="11435888" cy="3618616"/>
-            <a:chOff x="378056" y="1863491"/>
-            <a:chExt cx="11435888" cy="3618616"/>
-          </a:xfrm>
-        </p:grpSpPr>
-        <p:pic>
-          <p:nvPicPr>
-            <p:cNvPr id="5" name="Picture 4">
-              <a:extLst>
-                <a:ext uri="{FF2B5EF4-FFF2-40B4-BE49-F238E27FC236}">
-                  <a16:creationId xmlns:a16="http://schemas.microsoft.com/office/drawing/2014/main" id="{CD3CB975-CC63-484E-8384-BD7344451C0B}"/>
-                </a:ext>
-              </a:extLst>
-            </p:cNvPr>
-            <p:cNvPicPr>
-              <a:picLocks noChangeAspect="1"/>
-            </p:cNvPicPr>
-            <p:nvPr/>
-          </p:nvPicPr>
-          <p:blipFill rotWithShape="1">
-            <a:blip r:embed="rId2">
-              <a:extLst>
-                <a:ext uri="{28A0092B-C50C-407E-A947-70E740481C1C}">
-                  <a14:useLocalDpi xmlns:a14="http://schemas.microsoft.com/office/drawing/2010/main" val="0"/>
-                </a:ext>
-              </a:extLst>
-            </a:blip>
-            <a:srcRect l="26185" t="30524" r="21115" b="5245"/>
-            <a:stretch/>
-          </p:blipFill>
-          <p:spPr>
-            <a:xfrm>
-              <a:off x="6968856" y="1863491"/>
-              <a:ext cx="4845088" cy="3131017"/>
-            </a:xfrm>
-            <a:prstGeom prst="rect">
-              <a:avLst/>
-            </a:prstGeom>
-          </p:spPr>
-        </p:pic>
-        <p:pic>
-          <p:nvPicPr>
-            <p:cNvPr id="7" name="Picture 6">
-              <a:extLst>
-                <a:ext uri="{FF2B5EF4-FFF2-40B4-BE49-F238E27FC236}">
-                  <a16:creationId xmlns:a16="http://schemas.microsoft.com/office/drawing/2014/main" id="{70234426-9A2F-477B-909C-36C40024ED6D}"/>
-                </a:ext>
-              </a:extLst>
-            </p:cNvPr>
-            <p:cNvPicPr>
-              <a:picLocks noChangeAspect="1"/>
-            </p:cNvPicPr>
-            <p:nvPr/>
-          </p:nvPicPr>
-          <p:blipFill rotWithShape="1">
-            <a:blip r:embed="rId3">
-              <a:extLst>
-                <a:ext uri="{28A0092B-C50C-407E-A947-70E740481C1C}">
-                  <a14:useLocalDpi xmlns:a14="http://schemas.microsoft.com/office/drawing/2010/main" val="0"/>
-                </a:ext>
-              </a:extLst>
-            </a:blip>
-            <a:srcRect l="27861" t="28510" b="5182"/>
-            <a:stretch/>
-          </p:blipFill>
-          <p:spPr>
-            <a:xfrm>
-              <a:off x="378056" y="1863491"/>
-              <a:ext cx="4845088" cy="3131016"/>
-            </a:xfrm>
-            <a:prstGeom prst="rect">
-              <a:avLst/>
-            </a:prstGeom>
-          </p:spPr>
-        </p:pic>
-        <p:sp>
-          <p:nvSpPr>
-            <p:cNvPr id="8" name="Arrow: Right 7">
-              <a:extLst>
-                <a:ext uri="{FF2B5EF4-FFF2-40B4-BE49-F238E27FC236}">
-                  <a16:creationId xmlns:a16="http://schemas.microsoft.com/office/drawing/2014/main" id="{2480BFCD-BA18-4F40-98AF-DC279BFA8ABB}"/>
-                </a:ext>
-              </a:extLst>
-            </p:cNvPr>
-            <p:cNvSpPr/>
-            <p:nvPr/>
-          </p:nvSpPr>
-          <p:spPr>
-            <a:xfrm>
-              <a:off x="5437238" y="2957050"/>
-              <a:ext cx="1179871" cy="943897"/>
-            </a:xfrm>
-            <a:prstGeom prst="rightArrow">
-              <a:avLst/>
-            </a:prstGeom>
-          </p:spPr>
-          <p:style>
-            <a:lnRef idx="2">
-              <a:schemeClr val="accent1">
-                <a:shade val="50000"/>
-              </a:schemeClr>
-            </a:lnRef>
-            <a:fillRef idx="1">
-              <a:schemeClr val="accent1"/>
-            </a:fillRef>
-            <a:effectRef idx="0">
-              <a:schemeClr val="accent1"/>
-            </a:effectRef>
-            <a:fontRef idx="minor">
-              <a:schemeClr val="lt1"/>
-            </a:fontRef>
-          </p:style>
-          <p:txBody>
-            <a:bodyPr rtlCol="0" anchor="ctr"/>
-            <a:lstStyle/>
-            <a:p>
-              <a:pPr algn="ctr"/>
-              <a:endParaRPr lang="en-SG"/>
-            </a:p>
-          </p:txBody>
-        </p:sp>
-        <p:sp>
-          <p:nvSpPr>
-            <p:cNvPr id="9" name="TextBox 8">
-              <a:extLst>
-                <a:ext uri="{FF2B5EF4-FFF2-40B4-BE49-F238E27FC236}">
-                  <a16:creationId xmlns:a16="http://schemas.microsoft.com/office/drawing/2014/main" id="{723DD81A-8E68-4E10-B1AD-33BE48BA193D}"/>
-                </a:ext>
-              </a:extLst>
-            </p:cNvPr>
-            <p:cNvSpPr txBox="1"/>
-            <p:nvPr/>
-          </p:nvSpPr>
-          <p:spPr>
-            <a:xfrm>
-              <a:off x="1838631" y="5112775"/>
-              <a:ext cx="2123768" cy="369332"/>
-            </a:xfrm>
-            <a:prstGeom prst="rect">
-              <a:avLst/>
-            </a:prstGeom>
-            <a:noFill/>
-          </p:spPr>
-          <p:txBody>
-            <a:bodyPr wrap="square" rtlCol="0">
-              <a:spAutoFit/>
-            </a:bodyPr>
-            <a:lstStyle/>
-            <a:p>
-              <a:r>
-                <a:rPr lang="en-SG" dirty="0"/>
-                <a:t>Original Version</a:t>
-              </a:r>
-            </a:p>
-          </p:txBody>
-        </p:sp>
-        <p:sp>
-          <p:nvSpPr>
-            <p:cNvPr id="10" name="TextBox 9">
-              <a:extLst>
-                <a:ext uri="{FF2B5EF4-FFF2-40B4-BE49-F238E27FC236}">
-                  <a16:creationId xmlns:a16="http://schemas.microsoft.com/office/drawing/2014/main" id="{0BEC037D-6679-4748-9F83-DF80D38BDD56}"/>
-                </a:ext>
-              </a:extLst>
-            </p:cNvPr>
-            <p:cNvSpPr txBox="1"/>
-            <p:nvPr/>
-          </p:nvSpPr>
-          <p:spPr>
-            <a:xfrm>
-              <a:off x="8608140" y="5112775"/>
-              <a:ext cx="2123768" cy="369332"/>
-            </a:xfrm>
-            <a:prstGeom prst="rect">
-              <a:avLst/>
-            </a:prstGeom>
-            <a:noFill/>
-          </p:spPr>
-          <p:txBody>
-            <a:bodyPr wrap="square" rtlCol="0">
-              <a:spAutoFit/>
-            </a:bodyPr>
-            <a:lstStyle/>
-            <a:p>
-              <a:r>
-                <a:rPr lang="en-SG" dirty="0"/>
-                <a:t>Modified Version</a:t>
-              </a:r>
-            </a:p>
-          </p:txBody>
-        </p:sp>
-      </p:grpSp>
-    </p:spTree>
-    <p:extLst>
-      <p:ext uri="{BB962C8B-B14F-4D97-AF65-F5344CB8AC3E}">
-        <p14:creationId xmlns:p14="http://schemas.microsoft.com/office/powerpoint/2010/main" val="1271228418"/>
-      </p:ext>
-    </p:extLst>
-  </p:cSld>
-  <p:clrMapOvr>
-    <a:masterClrMapping/>
-  </p:clrMapOvr>
-</p:sld>
-</file>
-
-<file path=ppt/slides/slide4.xml><?xml version="1.0" encoding="utf-8"?>
-<p:sld xmlns:a="http://schemas.openxmlformats.org/drawingml/2006/main" xmlns:r="http://schemas.openxmlformats.org/officeDocument/2006/relationships" xmlns:p="http://schemas.openxmlformats.org/presentationml/2006/main">
-  <p:cSld>
-    <p:spTree>
-      <p:nvGrpSpPr>
-        <p:cNvPr id="1" name=""/>
-        <p:cNvGrpSpPr/>
-        <p:nvPr/>
-      </p:nvGrpSpPr>
-      <p:grpSpPr>
-        <a:xfrm>
-          <a:off x="0" y="0"/>
-          <a:ext cx="0" cy="0"/>
-          <a:chOff x="0" y="0"/>
-          <a:chExt cx="0" cy="0"/>
-        </a:xfrm>
-      </p:grpSpPr>
-      <p:grpSp>
-        <p:nvGrpSpPr>
-          <p:cNvPr id="2" name="Group 1">
-            <a:extLst>
-              <a:ext uri="{FF2B5EF4-FFF2-40B4-BE49-F238E27FC236}">
-                <a16:creationId xmlns:a16="http://schemas.microsoft.com/office/drawing/2014/main" id="{BE2423CA-6B80-4781-A4D7-F6FBECA67029}"/>
-              </a:ext>
-            </a:extLst>
-          </p:cNvPr>
-          <p:cNvGrpSpPr/>
-          <p:nvPr/>
-        </p:nvGrpSpPr>
-        <p:grpSpPr>
-          <a:xfrm>
-            <a:off x="1649690" y="2083457"/>
-            <a:ext cx="8493551" cy="3058514"/>
-            <a:chOff x="1715678" y="2102311"/>
-            <a:chExt cx="8493551" cy="3058514"/>
-          </a:xfrm>
-        </p:grpSpPr>
-        <p:pic>
-          <p:nvPicPr>
-            <p:cNvPr id="5" name="Picture 4">
-              <a:extLst>
-                <a:ext uri="{FF2B5EF4-FFF2-40B4-BE49-F238E27FC236}">
-                  <a16:creationId xmlns:a16="http://schemas.microsoft.com/office/drawing/2014/main" id="{CD3CB975-CC63-484E-8384-BD7344451C0B}"/>
-                </a:ext>
-              </a:extLst>
-            </p:cNvPr>
-            <p:cNvPicPr>
-              <a:picLocks noChangeAspect="1"/>
-            </p:cNvPicPr>
-            <p:nvPr/>
-          </p:nvPicPr>
-          <p:blipFill rotWithShape="1">
-            <a:blip r:embed="rId2">
-              <a:extLst>
-                <a:ext uri="{28A0092B-C50C-407E-A947-70E740481C1C}">
-                  <a14:useLocalDpi xmlns:a14="http://schemas.microsoft.com/office/drawing/2010/main" val="0"/>
-                </a:ext>
-              </a:extLst>
-            </a:blip>
-            <a:srcRect l="-44" t="32624" r="73374" b="28297"/>
-            <a:stretch/>
-          </p:blipFill>
-          <p:spPr>
-            <a:xfrm>
-              <a:off x="6928702" y="2102311"/>
-              <a:ext cx="3280527" cy="2548529"/>
-            </a:xfrm>
-            <a:prstGeom prst="rect">
-              <a:avLst/>
-            </a:prstGeom>
-          </p:spPr>
-        </p:pic>
-        <p:pic>
-          <p:nvPicPr>
-            <p:cNvPr id="7" name="Picture 6">
-              <a:extLst>
-                <a:ext uri="{FF2B5EF4-FFF2-40B4-BE49-F238E27FC236}">
-                  <a16:creationId xmlns:a16="http://schemas.microsoft.com/office/drawing/2014/main" id="{70234426-9A2F-477B-909C-36C40024ED6D}"/>
-                </a:ext>
-              </a:extLst>
-            </p:cNvPr>
-            <p:cNvPicPr>
-              <a:picLocks noChangeAspect="1"/>
-            </p:cNvPicPr>
-            <p:nvPr/>
-          </p:nvPicPr>
-          <p:blipFill rotWithShape="1">
-            <a:blip r:embed="rId3">
-              <a:extLst>
-                <a:ext uri="{28A0092B-C50C-407E-A947-70E740481C1C}">
-                  <a14:useLocalDpi xmlns:a14="http://schemas.microsoft.com/office/drawing/2010/main" val="0"/>
-                </a:ext>
-              </a:extLst>
-            </a:blip>
-            <a:srcRect t="28765" r="72837" b="41516"/>
-            <a:stretch/>
-          </p:blipFill>
-          <p:spPr>
-            <a:xfrm>
-              <a:off x="1715678" y="2102311"/>
-              <a:ext cx="3280527" cy="2548528"/>
-            </a:xfrm>
-            <a:prstGeom prst="rect">
-              <a:avLst/>
-            </a:prstGeom>
-          </p:spPr>
-        </p:pic>
-        <p:sp>
-          <p:nvSpPr>
-            <p:cNvPr id="8" name="Arrow: Right 7">
-              <a:extLst>
-                <a:ext uri="{FF2B5EF4-FFF2-40B4-BE49-F238E27FC236}">
-                  <a16:creationId xmlns:a16="http://schemas.microsoft.com/office/drawing/2014/main" id="{2480BFCD-BA18-4F40-98AF-DC279BFA8ABB}"/>
-                </a:ext>
-              </a:extLst>
-            </p:cNvPr>
-            <p:cNvSpPr/>
-            <p:nvPr/>
-          </p:nvSpPr>
-          <p:spPr>
-            <a:xfrm>
-              <a:off x="5506064" y="2957051"/>
-              <a:ext cx="1179871" cy="943897"/>
-            </a:xfrm>
-            <a:prstGeom prst="rightArrow">
-              <a:avLst/>
-            </a:prstGeom>
-          </p:spPr>
-          <p:style>
-            <a:lnRef idx="2">
-              <a:schemeClr val="accent1">
-                <a:shade val="50000"/>
-              </a:schemeClr>
-            </a:lnRef>
-            <a:fillRef idx="1">
-              <a:schemeClr val="accent1"/>
-            </a:fillRef>
-            <a:effectRef idx="0">
-              <a:schemeClr val="accent1"/>
-            </a:effectRef>
-            <a:fontRef idx="minor">
-              <a:schemeClr val="lt1"/>
-            </a:fontRef>
-          </p:style>
-          <p:txBody>
-            <a:bodyPr rtlCol="0" anchor="ctr"/>
-            <a:lstStyle/>
-            <a:p>
-              <a:pPr algn="ctr"/>
-              <a:endParaRPr lang="en-SG"/>
-            </a:p>
-          </p:txBody>
-        </p:sp>
-        <p:sp>
-          <p:nvSpPr>
-            <p:cNvPr id="9" name="TextBox 8">
-              <a:extLst>
-                <a:ext uri="{FF2B5EF4-FFF2-40B4-BE49-F238E27FC236}">
-                  <a16:creationId xmlns:a16="http://schemas.microsoft.com/office/drawing/2014/main" id="{723DD81A-8E68-4E10-B1AD-33BE48BA193D}"/>
-                </a:ext>
-              </a:extLst>
-            </p:cNvPr>
-            <p:cNvSpPr txBox="1"/>
-            <p:nvPr/>
-          </p:nvSpPr>
-          <p:spPr>
-            <a:xfrm>
-              <a:off x="2375959" y="4775171"/>
-              <a:ext cx="2123768" cy="369332"/>
-            </a:xfrm>
-            <a:prstGeom prst="rect">
-              <a:avLst/>
-            </a:prstGeom>
-            <a:noFill/>
-          </p:spPr>
-          <p:txBody>
-            <a:bodyPr wrap="square" rtlCol="0">
-              <a:spAutoFit/>
-            </a:bodyPr>
-            <a:lstStyle/>
-            <a:p>
-              <a:r>
-                <a:rPr lang="en-SG" dirty="0"/>
-                <a:t>Original Version</a:t>
-              </a:r>
-            </a:p>
-          </p:txBody>
-        </p:sp>
-        <p:sp>
-          <p:nvSpPr>
-            <p:cNvPr id="10" name="TextBox 9">
-              <a:extLst>
-                <a:ext uri="{FF2B5EF4-FFF2-40B4-BE49-F238E27FC236}">
-                  <a16:creationId xmlns:a16="http://schemas.microsoft.com/office/drawing/2014/main" id="{0BEC037D-6679-4748-9F83-DF80D38BDD56}"/>
-                </a:ext>
-              </a:extLst>
-            </p:cNvPr>
-            <p:cNvSpPr txBox="1"/>
-            <p:nvPr/>
-          </p:nvSpPr>
-          <p:spPr>
-            <a:xfrm>
-              <a:off x="7778582" y="4791493"/>
-              <a:ext cx="2123768" cy="369332"/>
-            </a:xfrm>
-            <a:prstGeom prst="rect">
-              <a:avLst/>
-            </a:prstGeom>
-            <a:noFill/>
-          </p:spPr>
-          <p:txBody>
-            <a:bodyPr wrap="square" rtlCol="0">
-              <a:spAutoFit/>
-            </a:bodyPr>
-            <a:lstStyle/>
-            <a:p>
-              <a:r>
-                <a:rPr lang="en-SG" dirty="0"/>
-                <a:t>Improved Version</a:t>
-              </a:r>
-            </a:p>
-          </p:txBody>
-        </p:sp>
-      </p:grpSp>
-    </p:spTree>
-    <p:extLst>
-      <p:ext uri="{BB962C8B-B14F-4D97-AF65-F5344CB8AC3E}">
-        <p14:creationId xmlns:p14="http://schemas.microsoft.com/office/powerpoint/2010/main" val="118191816"/>
-      </p:ext>
-    </p:extLst>
-  </p:cSld>
-  <p:clrMapOvr>
-    <a:masterClrMapping/>
-  </p:clrMapOvr>
-</p:sld>
-</file>
-
 <file path=ppt/theme/theme1.xml><?xml version="1.0" encoding="utf-8"?>
 <a:theme xmlns:a="http://schemas.openxmlformats.org/drawingml/2006/main" name="Office Theme">
   <a:themeElements>

</xml_diff>

<commit_message>
Update UGDG with Autofill and Remark
</commit_message>
<xml_diff>
--- a/docs/diagrams/UiMockUp.pptx
+++ b/docs/diagrams/UiMockUp.pptx
@@ -262,7 +262,7 @@
           <a:p>
             <a:fld id="{181FA2F3-BF46-4223-8368-B788E003980A}" type="datetimeFigureOut">
               <a:rPr lang="en-SG" smtClean="0"/>
-              <a:t>20/3/2018</a:t>
+              <a:t>27/3/2018</a:t>
             </a:fld>
             <a:endParaRPr lang="en-SG"/>
           </a:p>
@@ -462,7 +462,7 @@
           <a:p>
             <a:fld id="{181FA2F3-BF46-4223-8368-B788E003980A}" type="datetimeFigureOut">
               <a:rPr lang="en-SG" smtClean="0"/>
-              <a:t>20/3/2018</a:t>
+              <a:t>27/3/2018</a:t>
             </a:fld>
             <a:endParaRPr lang="en-SG"/>
           </a:p>
@@ -672,7 +672,7 @@
           <a:p>
             <a:fld id="{181FA2F3-BF46-4223-8368-B788E003980A}" type="datetimeFigureOut">
               <a:rPr lang="en-SG" smtClean="0"/>
-              <a:t>20/3/2018</a:t>
+              <a:t>27/3/2018</a:t>
             </a:fld>
             <a:endParaRPr lang="en-SG"/>
           </a:p>
@@ -872,7 +872,7 @@
           <a:p>
             <a:fld id="{181FA2F3-BF46-4223-8368-B788E003980A}" type="datetimeFigureOut">
               <a:rPr lang="en-SG" smtClean="0"/>
-              <a:t>20/3/2018</a:t>
+              <a:t>27/3/2018</a:t>
             </a:fld>
             <a:endParaRPr lang="en-SG"/>
           </a:p>
@@ -1148,7 +1148,7 @@
           <a:p>
             <a:fld id="{181FA2F3-BF46-4223-8368-B788E003980A}" type="datetimeFigureOut">
               <a:rPr lang="en-SG" smtClean="0"/>
-              <a:t>20/3/2018</a:t>
+              <a:t>27/3/2018</a:t>
             </a:fld>
             <a:endParaRPr lang="en-SG"/>
           </a:p>
@@ -1416,7 +1416,7 @@
           <a:p>
             <a:fld id="{181FA2F3-BF46-4223-8368-B788E003980A}" type="datetimeFigureOut">
               <a:rPr lang="en-SG" smtClean="0"/>
-              <a:t>20/3/2018</a:t>
+              <a:t>27/3/2018</a:t>
             </a:fld>
             <a:endParaRPr lang="en-SG"/>
           </a:p>
@@ -1831,7 +1831,7 @@
           <a:p>
             <a:fld id="{181FA2F3-BF46-4223-8368-B788E003980A}" type="datetimeFigureOut">
               <a:rPr lang="en-SG" smtClean="0"/>
-              <a:t>20/3/2018</a:t>
+              <a:t>27/3/2018</a:t>
             </a:fld>
             <a:endParaRPr lang="en-SG"/>
           </a:p>
@@ -1973,7 +1973,7 @@
           <a:p>
             <a:fld id="{181FA2F3-BF46-4223-8368-B788E003980A}" type="datetimeFigureOut">
               <a:rPr lang="en-SG" smtClean="0"/>
-              <a:t>20/3/2018</a:t>
+              <a:t>27/3/2018</a:t>
             </a:fld>
             <a:endParaRPr lang="en-SG"/>
           </a:p>
@@ -2086,7 +2086,7 @@
           <a:p>
             <a:fld id="{181FA2F3-BF46-4223-8368-B788E003980A}" type="datetimeFigureOut">
               <a:rPr lang="en-SG" smtClean="0"/>
-              <a:t>20/3/2018</a:t>
+              <a:t>27/3/2018</a:t>
             </a:fld>
             <a:endParaRPr lang="en-SG"/>
           </a:p>
@@ -2399,7 +2399,7 @@
           <a:p>
             <a:fld id="{181FA2F3-BF46-4223-8368-B788E003980A}" type="datetimeFigureOut">
               <a:rPr lang="en-SG" smtClean="0"/>
-              <a:t>20/3/2018</a:t>
+              <a:t>27/3/2018</a:t>
             </a:fld>
             <a:endParaRPr lang="en-SG"/>
           </a:p>
@@ -2688,7 +2688,7 @@
           <a:p>
             <a:fld id="{181FA2F3-BF46-4223-8368-B788E003980A}" type="datetimeFigureOut">
               <a:rPr lang="en-SG" smtClean="0"/>
-              <a:t>20/3/2018</a:t>
+              <a:t>27/3/2018</a:t>
             </a:fld>
             <a:endParaRPr lang="en-SG"/>
           </a:p>
@@ -2931,7 +2931,7 @@
           <a:p>
             <a:fld id="{181FA2F3-BF46-4223-8368-B788E003980A}" type="datetimeFigureOut">
               <a:rPr lang="en-SG" smtClean="0"/>
-              <a:t>20/3/2018</a:t>
+              <a:t>27/3/2018</a:t>
             </a:fld>
             <a:endParaRPr lang="en-SG"/>
           </a:p>

</xml_diff>

<commit_message>
Updates to UG with labelling for UI
</commit_message>
<xml_diff>
--- a/docs/diagrams/UiMockUp.pptx
+++ b/docs/diagrams/UiMockUp.pptx
@@ -5,8 +5,9 @@
     <p:sldMasterId id="2147483648" r:id="rId1"/>
   </p:sldMasterIdLst>
   <p:sldIdLst>
-    <p:sldId id="256" r:id="rId2"/>
-    <p:sldId id="257" r:id="rId3"/>
+    <p:sldId id="258" r:id="rId2"/>
+    <p:sldId id="256" r:id="rId3"/>
+    <p:sldId id="257" r:id="rId4"/>
   </p:sldIdLst>
   <p:sldSz cx="12192000" cy="6858000"/>
   <p:notesSz cx="6858000" cy="9144000"/>
@@ -262,7 +263,7 @@
           <a:p>
             <a:fld id="{181FA2F3-BF46-4223-8368-B788E003980A}" type="datetimeFigureOut">
               <a:rPr lang="en-SG" smtClean="0"/>
-              <a:t>27/3/2018</a:t>
+              <a:t>5/4/2018</a:t>
             </a:fld>
             <a:endParaRPr lang="en-SG"/>
           </a:p>
@@ -462,7 +463,7 @@
           <a:p>
             <a:fld id="{181FA2F3-BF46-4223-8368-B788E003980A}" type="datetimeFigureOut">
               <a:rPr lang="en-SG" smtClean="0"/>
-              <a:t>27/3/2018</a:t>
+              <a:t>5/4/2018</a:t>
             </a:fld>
             <a:endParaRPr lang="en-SG"/>
           </a:p>
@@ -672,7 +673,7 @@
           <a:p>
             <a:fld id="{181FA2F3-BF46-4223-8368-B788E003980A}" type="datetimeFigureOut">
               <a:rPr lang="en-SG" smtClean="0"/>
-              <a:t>27/3/2018</a:t>
+              <a:t>5/4/2018</a:t>
             </a:fld>
             <a:endParaRPr lang="en-SG"/>
           </a:p>
@@ -872,7 +873,7 @@
           <a:p>
             <a:fld id="{181FA2F3-BF46-4223-8368-B788E003980A}" type="datetimeFigureOut">
               <a:rPr lang="en-SG" smtClean="0"/>
-              <a:t>27/3/2018</a:t>
+              <a:t>5/4/2018</a:t>
             </a:fld>
             <a:endParaRPr lang="en-SG"/>
           </a:p>
@@ -1148,7 +1149,7 @@
           <a:p>
             <a:fld id="{181FA2F3-BF46-4223-8368-B788E003980A}" type="datetimeFigureOut">
               <a:rPr lang="en-SG" smtClean="0"/>
-              <a:t>27/3/2018</a:t>
+              <a:t>5/4/2018</a:t>
             </a:fld>
             <a:endParaRPr lang="en-SG"/>
           </a:p>
@@ -1416,7 +1417,7 @@
           <a:p>
             <a:fld id="{181FA2F3-BF46-4223-8368-B788E003980A}" type="datetimeFigureOut">
               <a:rPr lang="en-SG" smtClean="0"/>
-              <a:t>27/3/2018</a:t>
+              <a:t>5/4/2018</a:t>
             </a:fld>
             <a:endParaRPr lang="en-SG"/>
           </a:p>
@@ -1831,7 +1832,7 @@
           <a:p>
             <a:fld id="{181FA2F3-BF46-4223-8368-B788E003980A}" type="datetimeFigureOut">
               <a:rPr lang="en-SG" smtClean="0"/>
-              <a:t>27/3/2018</a:t>
+              <a:t>5/4/2018</a:t>
             </a:fld>
             <a:endParaRPr lang="en-SG"/>
           </a:p>
@@ -1973,7 +1974,7 @@
           <a:p>
             <a:fld id="{181FA2F3-BF46-4223-8368-B788E003980A}" type="datetimeFigureOut">
               <a:rPr lang="en-SG" smtClean="0"/>
-              <a:t>27/3/2018</a:t>
+              <a:t>5/4/2018</a:t>
             </a:fld>
             <a:endParaRPr lang="en-SG"/>
           </a:p>
@@ -2086,7 +2087,7 @@
           <a:p>
             <a:fld id="{181FA2F3-BF46-4223-8368-B788E003980A}" type="datetimeFigureOut">
               <a:rPr lang="en-SG" smtClean="0"/>
-              <a:t>27/3/2018</a:t>
+              <a:t>5/4/2018</a:t>
             </a:fld>
             <a:endParaRPr lang="en-SG"/>
           </a:p>
@@ -2399,7 +2400,7 @@
           <a:p>
             <a:fld id="{181FA2F3-BF46-4223-8368-B788E003980A}" type="datetimeFigureOut">
               <a:rPr lang="en-SG" smtClean="0"/>
-              <a:t>27/3/2018</a:t>
+              <a:t>5/4/2018</a:t>
             </a:fld>
             <a:endParaRPr lang="en-SG"/>
           </a:p>
@@ -2688,7 +2689,7 @@
           <a:p>
             <a:fld id="{181FA2F3-BF46-4223-8368-B788E003980A}" type="datetimeFigureOut">
               <a:rPr lang="en-SG" smtClean="0"/>
-              <a:t>27/3/2018</a:t>
+              <a:t>5/4/2018</a:t>
             </a:fld>
             <a:endParaRPr lang="en-SG"/>
           </a:p>
@@ -2931,7 +2932,7 @@
           <a:p>
             <a:fld id="{181FA2F3-BF46-4223-8368-B788E003980A}" type="datetimeFigureOut">
               <a:rPr lang="en-SG" smtClean="0"/>
-              <a:t>27/3/2018</a:t>
+              <a:t>5/4/2018</a:t>
             </a:fld>
             <a:endParaRPr lang="en-SG"/>
           </a:p>
@@ -3348,6 +3349,646 @@
           <a:chExt cx="0" cy="0"/>
         </a:xfrm>
       </p:grpSpPr>
+      <p:pic>
+        <p:nvPicPr>
+          <p:cNvPr id="5" name="Picture 4">
+            <a:extLst>
+              <a:ext uri="{FF2B5EF4-FFF2-40B4-BE49-F238E27FC236}">
+                <a16:creationId xmlns:a16="http://schemas.microsoft.com/office/drawing/2014/main" id="{63F3703F-1EC0-4CA9-B534-75839AE73466}"/>
+              </a:ext>
+            </a:extLst>
+          </p:cNvPr>
+          <p:cNvPicPr>
+            <a:picLocks noChangeAspect="1"/>
+          </p:cNvPicPr>
+          <p:nvPr/>
+        </p:nvPicPr>
+        <p:blipFill>
+          <a:blip r:embed="rId2">
+            <a:extLst>
+              <a:ext uri="{28A0092B-C50C-407E-A947-70E740481C1C}">
+                <a14:useLocalDpi xmlns:a14="http://schemas.microsoft.com/office/drawing/2010/main" val="0"/>
+              </a:ext>
+            </a:extLst>
+          </a:blip>
+          <a:stretch>
+            <a:fillRect/>
+          </a:stretch>
+        </p:blipFill>
+        <p:spPr>
+          <a:xfrm>
+            <a:off x="625996" y="742218"/>
+            <a:ext cx="10458901" cy="5696290"/>
+          </a:xfrm>
+          <a:prstGeom prst="rect">
+            <a:avLst/>
+          </a:prstGeom>
+        </p:spPr>
+      </p:pic>
+      <p:grpSp>
+        <p:nvGrpSpPr>
+          <p:cNvPr id="8" name="Group 7">
+            <a:extLst>
+              <a:ext uri="{FF2B5EF4-FFF2-40B4-BE49-F238E27FC236}">
+                <a16:creationId xmlns:a16="http://schemas.microsoft.com/office/drawing/2014/main" id="{A59D152B-3FB0-4142-AE8F-100228B3C236}"/>
+              </a:ext>
+            </a:extLst>
+          </p:cNvPr>
+          <p:cNvGrpSpPr/>
+          <p:nvPr/>
+        </p:nvGrpSpPr>
+        <p:grpSpPr>
+          <a:xfrm>
+            <a:off x="348794" y="1216056"/>
+            <a:ext cx="10671140" cy="556183"/>
+            <a:chOff x="348794" y="1216056"/>
+            <a:chExt cx="10671140" cy="556183"/>
+          </a:xfrm>
+        </p:grpSpPr>
+        <p:sp>
+          <p:nvSpPr>
+            <p:cNvPr id="6" name="Rectangle 5">
+              <a:extLst>
+                <a:ext uri="{FF2B5EF4-FFF2-40B4-BE49-F238E27FC236}">
+                  <a16:creationId xmlns:a16="http://schemas.microsoft.com/office/drawing/2014/main" id="{F9997882-AFBB-4ABF-BDD9-B7342E548657}"/>
+                </a:ext>
+              </a:extLst>
+            </p:cNvPr>
+            <p:cNvSpPr/>
+            <p:nvPr/>
+          </p:nvSpPr>
+          <p:spPr>
+            <a:xfrm>
+              <a:off x="688157" y="1291472"/>
+              <a:ext cx="10331777" cy="480767"/>
+            </a:xfrm>
+            <a:prstGeom prst="rect">
+              <a:avLst/>
+            </a:prstGeom>
+            <a:noFill/>
+            <a:ln w="28575">
+              <a:solidFill>
+                <a:srgbClr val="FF0000"/>
+              </a:solidFill>
+            </a:ln>
+          </p:spPr>
+          <p:style>
+            <a:lnRef idx="2">
+              <a:schemeClr val="accent2"/>
+            </a:lnRef>
+            <a:fillRef idx="1">
+              <a:schemeClr val="lt1"/>
+            </a:fillRef>
+            <a:effectRef idx="0">
+              <a:schemeClr val="accent2"/>
+            </a:effectRef>
+            <a:fontRef idx="minor">
+              <a:schemeClr val="dk1"/>
+            </a:fontRef>
+          </p:style>
+          <p:txBody>
+            <a:bodyPr rtlCol="0" anchor="ctr"/>
+            <a:lstStyle/>
+            <a:p>
+              <a:pPr algn="ctr"/>
+              <a:endParaRPr lang="en-SG" dirty="0"/>
+            </a:p>
+          </p:txBody>
+        </p:sp>
+        <p:sp>
+          <p:nvSpPr>
+            <p:cNvPr id="7" name="TextBox 6">
+              <a:extLst>
+                <a:ext uri="{FF2B5EF4-FFF2-40B4-BE49-F238E27FC236}">
+                  <a16:creationId xmlns:a16="http://schemas.microsoft.com/office/drawing/2014/main" id="{49429808-B082-419D-96B2-059A841882EC}"/>
+                </a:ext>
+              </a:extLst>
+            </p:cNvPr>
+            <p:cNvSpPr txBox="1"/>
+            <p:nvPr/>
+          </p:nvSpPr>
+          <p:spPr>
+            <a:xfrm>
+              <a:off x="348794" y="1216056"/>
+              <a:ext cx="395925" cy="369332"/>
+            </a:xfrm>
+            <a:prstGeom prst="rect">
+              <a:avLst/>
+            </a:prstGeom>
+            <a:solidFill>
+              <a:schemeClr val="bg1"/>
+            </a:solidFill>
+            <a:ln w="38100">
+              <a:solidFill>
+                <a:srgbClr val="FF0000"/>
+              </a:solidFill>
+            </a:ln>
+          </p:spPr>
+          <p:txBody>
+            <a:bodyPr wrap="square" rtlCol="0">
+              <a:spAutoFit/>
+            </a:bodyPr>
+            <a:lstStyle/>
+            <a:p>
+              <a:pPr algn="ctr"/>
+              <a:r>
+                <a:rPr lang="en-SG" b="1" dirty="0"/>
+                <a:t>1</a:t>
+              </a:r>
+            </a:p>
+          </p:txBody>
+        </p:sp>
+      </p:grpSp>
+      <p:grpSp>
+        <p:nvGrpSpPr>
+          <p:cNvPr id="9" name="Group 8">
+            <a:extLst>
+              <a:ext uri="{FF2B5EF4-FFF2-40B4-BE49-F238E27FC236}">
+                <a16:creationId xmlns:a16="http://schemas.microsoft.com/office/drawing/2014/main" id="{6A944E35-6155-458B-8AA2-76560C541F68}"/>
+              </a:ext>
+            </a:extLst>
+          </p:cNvPr>
+          <p:cNvGrpSpPr/>
+          <p:nvPr/>
+        </p:nvGrpSpPr>
+        <p:grpSpPr>
+          <a:xfrm>
+            <a:off x="348794" y="1842409"/>
+            <a:ext cx="10671140" cy="721682"/>
+            <a:chOff x="348794" y="1216056"/>
+            <a:chExt cx="10671140" cy="721682"/>
+          </a:xfrm>
+        </p:grpSpPr>
+        <p:sp>
+          <p:nvSpPr>
+            <p:cNvPr id="10" name="Rectangle 9">
+              <a:extLst>
+                <a:ext uri="{FF2B5EF4-FFF2-40B4-BE49-F238E27FC236}">
+                  <a16:creationId xmlns:a16="http://schemas.microsoft.com/office/drawing/2014/main" id="{59DA48F1-8EE8-4E35-B509-DDF08A924B3D}"/>
+                </a:ext>
+              </a:extLst>
+            </p:cNvPr>
+            <p:cNvSpPr/>
+            <p:nvPr/>
+          </p:nvSpPr>
+          <p:spPr>
+            <a:xfrm>
+              <a:off x="688157" y="1291472"/>
+              <a:ext cx="10331777" cy="646266"/>
+            </a:xfrm>
+            <a:prstGeom prst="rect">
+              <a:avLst/>
+            </a:prstGeom>
+            <a:noFill/>
+            <a:ln w="28575">
+              <a:solidFill>
+                <a:schemeClr val="accent5">
+                  <a:lumMod val="75000"/>
+                </a:schemeClr>
+              </a:solidFill>
+            </a:ln>
+          </p:spPr>
+          <p:style>
+            <a:lnRef idx="2">
+              <a:schemeClr val="accent2"/>
+            </a:lnRef>
+            <a:fillRef idx="1">
+              <a:schemeClr val="lt1"/>
+            </a:fillRef>
+            <a:effectRef idx="0">
+              <a:schemeClr val="accent2"/>
+            </a:effectRef>
+            <a:fontRef idx="minor">
+              <a:schemeClr val="dk1"/>
+            </a:fontRef>
+          </p:style>
+          <p:txBody>
+            <a:bodyPr rtlCol="0" anchor="ctr"/>
+            <a:lstStyle/>
+            <a:p>
+              <a:pPr algn="ctr"/>
+              <a:endParaRPr lang="en-SG" dirty="0"/>
+            </a:p>
+          </p:txBody>
+        </p:sp>
+        <p:sp>
+          <p:nvSpPr>
+            <p:cNvPr id="11" name="TextBox 10">
+              <a:extLst>
+                <a:ext uri="{FF2B5EF4-FFF2-40B4-BE49-F238E27FC236}">
+                  <a16:creationId xmlns:a16="http://schemas.microsoft.com/office/drawing/2014/main" id="{91EA9154-2012-45CB-9932-FB8E8AE4F1B2}"/>
+                </a:ext>
+              </a:extLst>
+            </p:cNvPr>
+            <p:cNvSpPr txBox="1"/>
+            <p:nvPr/>
+          </p:nvSpPr>
+          <p:spPr>
+            <a:xfrm>
+              <a:off x="348794" y="1216056"/>
+              <a:ext cx="395925" cy="369332"/>
+            </a:xfrm>
+            <a:prstGeom prst="rect">
+              <a:avLst/>
+            </a:prstGeom>
+            <a:solidFill>
+              <a:schemeClr val="bg1"/>
+            </a:solidFill>
+            <a:ln w="38100">
+              <a:solidFill>
+                <a:schemeClr val="accent5">
+                  <a:lumMod val="75000"/>
+                </a:schemeClr>
+              </a:solidFill>
+            </a:ln>
+          </p:spPr>
+          <p:txBody>
+            <a:bodyPr wrap="square" rtlCol="0">
+              <a:spAutoFit/>
+            </a:bodyPr>
+            <a:lstStyle/>
+            <a:p>
+              <a:pPr algn="ctr"/>
+              <a:r>
+                <a:rPr lang="en-SG" b="1" dirty="0"/>
+                <a:t>2</a:t>
+              </a:r>
+            </a:p>
+          </p:txBody>
+        </p:sp>
+      </p:grpSp>
+      <p:grpSp>
+        <p:nvGrpSpPr>
+          <p:cNvPr id="12" name="Group 11">
+            <a:extLst>
+              <a:ext uri="{FF2B5EF4-FFF2-40B4-BE49-F238E27FC236}">
+                <a16:creationId xmlns:a16="http://schemas.microsoft.com/office/drawing/2014/main" id="{6DE27BEE-BCAB-484A-AFC9-68A24DEE6A83}"/>
+              </a:ext>
+            </a:extLst>
+          </p:cNvPr>
+          <p:cNvGrpSpPr/>
+          <p:nvPr/>
+        </p:nvGrpSpPr>
+        <p:grpSpPr>
+          <a:xfrm>
+            <a:off x="348794" y="2626924"/>
+            <a:ext cx="3195684" cy="3415656"/>
+            <a:chOff x="348794" y="1216056"/>
+            <a:chExt cx="3195684" cy="3415656"/>
+          </a:xfrm>
+        </p:grpSpPr>
+        <p:sp>
+          <p:nvSpPr>
+            <p:cNvPr id="13" name="Rectangle 12">
+              <a:extLst>
+                <a:ext uri="{FF2B5EF4-FFF2-40B4-BE49-F238E27FC236}">
+                  <a16:creationId xmlns:a16="http://schemas.microsoft.com/office/drawing/2014/main" id="{6D724ED0-2F3D-485B-9D6E-D4EC5344366B}"/>
+                </a:ext>
+              </a:extLst>
+            </p:cNvPr>
+            <p:cNvSpPr/>
+            <p:nvPr/>
+          </p:nvSpPr>
+          <p:spPr>
+            <a:xfrm>
+              <a:off x="688157" y="1298809"/>
+              <a:ext cx="2856321" cy="3332903"/>
+            </a:xfrm>
+            <a:prstGeom prst="rect">
+              <a:avLst/>
+            </a:prstGeom>
+            <a:noFill/>
+            <a:ln w="28575">
+              <a:solidFill>
+                <a:srgbClr val="00B050"/>
+              </a:solidFill>
+            </a:ln>
+          </p:spPr>
+          <p:style>
+            <a:lnRef idx="2">
+              <a:schemeClr val="accent2"/>
+            </a:lnRef>
+            <a:fillRef idx="1">
+              <a:schemeClr val="lt1"/>
+            </a:fillRef>
+            <a:effectRef idx="0">
+              <a:schemeClr val="accent2"/>
+            </a:effectRef>
+            <a:fontRef idx="minor">
+              <a:schemeClr val="dk1"/>
+            </a:fontRef>
+          </p:style>
+          <p:txBody>
+            <a:bodyPr rtlCol="0" anchor="ctr"/>
+            <a:lstStyle/>
+            <a:p>
+              <a:pPr algn="ctr"/>
+              <a:endParaRPr lang="en-SG" dirty="0"/>
+            </a:p>
+          </p:txBody>
+        </p:sp>
+        <p:sp>
+          <p:nvSpPr>
+            <p:cNvPr id="14" name="TextBox 13">
+              <a:extLst>
+                <a:ext uri="{FF2B5EF4-FFF2-40B4-BE49-F238E27FC236}">
+                  <a16:creationId xmlns:a16="http://schemas.microsoft.com/office/drawing/2014/main" id="{96E9ACDF-D4F5-4193-A54E-4FBAC501A4A2}"/>
+                </a:ext>
+              </a:extLst>
+            </p:cNvPr>
+            <p:cNvSpPr txBox="1"/>
+            <p:nvPr/>
+          </p:nvSpPr>
+          <p:spPr>
+            <a:xfrm>
+              <a:off x="348794" y="1216056"/>
+              <a:ext cx="395925" cy="369332"/>
+            </a:xfrm>
+            <a:prstGeom prst="rect">
+              <a:avLst/>
+            </a:prstGeom>
+            <a:solidFill>
+              <a:schemeClr val="bg1"/>
+            </a:solidFill>
+            <a:ln w="38100">
+              <a:solidFill>
+                <a:srgbClr val="00B050"/>
+              </a:solidFill>
+            </a:ln>
+          </p:spPr>
+          <p:txBody>
+            <a:bodyPr wrap="square" rtlCol="0">
+              <a:spAutoFit/>
+            </a:bodyPr>
+            <a:lstStyle/>
+            <a:p>
+              <a:pPr algn="ctr"/>
+              <a:r>
+                <a:rPr lang="en-SG" b="1" dirty="0"/>
+                <a:t>3</a:t>
+              </a:r>
+            </a:p>
+          </p:txBody>
+        </p:sp>
+      </p:grpSp>
+      <p:grpSp>
+        <p:nvGrpSpPr>
+          <p:cNvPr id="15" name="Group 14">
+            <a:extLst>
+              <a:ext uri="{FF2B5EF4-FFF2-40B4-BE49-F238E27FC236}">
+                <a16:creationId xmlns:a16="http://schemas.microsoft.com/office/drawing/2014/main" id="{4262A52F-489D-462F-960E-BC5F4A752B9E}"/>
+              </a:ext>
+            </a:extLst>
+          </p:cNvPr>
+          <p:cNvGrpSpPr/>
+          <p:nvPr/>
+        </p:nvGrpSpPr>
+        <p:grpSpPr>
+          <a:xfrm>
+            <a:off x="3349089" y="2646844"/>
+            <a:ext cx="3109842" cy="3395736"/>
+            <a:chOff x="434636" y="1276818"/>
+            <a:chExt cx="3109842" cy="3395736"/>
+          </a:xfrm>
+        </p:grpSpPr>
+        <p:sp>
+          <p:nvSpPr>
+            <p:cNvPr id="16" name="Rectangle 15">
+              <a:extLst>
+                <a:ext uri="{FF2B5EF4-FFF2-40B4-BE49-F238E27FC236}">
+                  <a16:creationId xmlns:a16="http://schemas.microsoft.com/office/drawing/2014/main" id="{49DA5D01-7F6C-429D-9689-91A7F867517A}"/>
+                </a:ext>
+              </a:extLst>
+            </p:cNvPr>
+            <p:cNvSpPr/>
+            <p:nvPr/>
+          </p:nvSpPr>
+          <p:spPr>
+            <a:xfrm>
+              <a:off x="744719" y="1339651"/>
+              <a:ext cx="2799759" cy="3332903"/>
+            </a:xfrm>
+            <a:prstGeom prst="rect">
+              <a:avLst/>
+            </a:prstGeom>
+            <a:noFill/>
+            <a:ln w="28575">
+              <a:solidFill>
+                <a:srgbClr val="FFC000"/>
+              </a:solidFill>
+            </a:ln>
+          </p:spPr>
+          <p:style>
+            <a:lnRef idx="2">
+              <a:schemeClr val="accent2"/>
+            </a:lnRef>
+            <a:fillRef idx="1">
+              <a:schemeClr val="lt1"/>
+            </a:fillRef>
+            <a:effectRef idx="0">
+              <a:schemeClr val="accent2"/>
+            </a:effectRef>
+            <a:fontRef idx="minor">
+              <a:schemeClr val="dk1"/>
+            </a:fontRef>
+          </p:style>
+          <p:txBody>
+            <a:bodyPr rtlCol="0" anchor="ctr"/>
+            <a:lstStyle/>
+            <a:p>
+              <a:pPr algn="ctr"/>
+              <a:endParaRPr lang="en-SG" dirty="0"/>
+            </a:p>
+          </p:txBody>
+        </p:sp>
+        <p:sp>
+          <p:nvSpPr>
+            <p:cNvPr id="17" name="TextBox 16">
+              <a:extLst>
+                <a:ext uri="{FF2B5EF4-FFF2-40B4-BE49-F238E27FC236}">
+                  <a16:creationId xmlns:a16="http://schemas.microsoft.com/office/drawing/2014/main" id="{FDA4F43C-EBD0-4299-8E96-92809FFACD08}"/>
+                </a:ext>
+              </a:extLst>
+            </p:cNvPr>
+            <p:cNvSpPr txBox="1"/>
+            <p:nvPr/>
+          </p:nvSpPr>
+          <p:spPr>
+            <a:xfrm>
+              <a:off x="434636" y="1276818"/>
+              <a:ext cx="395925" cy="369332"/>
+            </a:xfrm>
+            <a:prstGeom prst="rect">
+              <a:avLst/>
+            </a:prstGeom>
+            <a:solidFill>
+              <a:schemeClr val="bg1"/>
+            </a:solidFill>
+            <a:ln w="38100">
+              <a:solidFill>
+                <a:srgbClr val="FFC000"/>
+              </a:solidFill>
+            </a:ln>
+          </p:spPr>
+          <p:txBody>
+            <a:bodyPr wrap="square" rtlCol="0">
+              <a:spAutoFit/>
+            </a:bodyPr>
+            <a:lstStyle/>
+            <a:p>
+              <a:pPr algn="ctr"/>
+              <a:r>
+                <a:rPr lang="en-SG" b="1" dirty="0"/>
+                <a:t>4</a:t>
+              </a:r>
+            </a:p>
+          </p:txBody>
+        </p:sp>
+      </p:grpSp>
+      <p:grpSp>
+        <p:nvGrpSpPr>
+          <p:cNvPr id="19" name="Group 18">
+            <a:extLst>
+              <a:ext uri="{FF2B5EF4-FFF2-40B4-BE49-F238E27FC236}">
+                <a16:creationId xmlns:a16="http://schemas.microsoft.com/office/drawing/2014/main" id="{530CA3FE-4E2B-4A52-8073-576BB673D943}"/>
+              </a:ext>
+            </a:extLst>
+          </p:cNvPr>
+          <p:cNvGrpSpPr/>
+          <p:nvPr/>
+        </p:nvGrpSpPr>
+        <p:grpSpPr>
+          <a:xfrm>
+            <a:off x="6543986" y="2639507"/>
+            <a:ext cx="4475948" cy="3403073"/>
+            <a:chOff x="773212" y="1276818"/>
+            <a:chExt cx="4475948" cy="3403073"/>
+          </a:xfrm>
+        </p:grpSpPr>
+        <p:sp>
+          <p:nvSpPr>
+            <p:cNvPr id="20" name="Rectangle 19">
+              <a:extLst>
+                <a:ext uri="{FF2B5EF4-FFF2-40B4-BE49-F238E27FC236}">
+                  <a16:creationId xmlns:a16="http://schemas.microsoft.com/office/drawing/2014/main" id="{83DB924E-741F-465A-B524-6A8915EA1C12}"/>
+                </a:ext>
+              </a:extLst>
+            </p:cNvPr>
+            <p:cNvSpPr/>
+            <p:nvPr/>
+          </p:nvSpPr>
+          <p:spPr>
+            <a:xfrm>
+              <a:off x="802851" y="1339651"/>
+              <a:ext cx="4446309" cy="3340240"/>
+            </a:xfrm>
+            <a:prstGeom prst="rect">
+              <a:avLst/>
+            </a:prstGeom>
+            <a:noFill/>
+            <a:ln w="28575">
+              <a:solidFill>
+                <a:srgbClr val="9148C8"/>
+              </a:solidFill>
+            </a:ln>
+          </p:spPr>
+          <p:style>
+            <a:lnRef idx="2">
+              <a:schemeClr val="accent2"/>
+            </a:lnRef>
+            <a:fillRef idx="1">
+              <a:schemeClr val="lt1"/>
+            </a:fillRef>
+            <a:effectRef idx="0">
+              <a:schemeClr val="accent2"/>
+            </a:effectRef>
+            <a:fontRef idx="minor">
+              <a:schemeClr val="dk1"/>
+            </a:fontRef>
+          </p:style>
+          <p:txBody>
+            <a:bodyPr rtlCol="0" anchor="ctr"/>
+            <a:lstStyle/>
+            <a:p>
+              <a:pPr algn="ctr"/>
+              <a:endParaRPr lang="en-SG" dirty="0"/>
+            </a:p>
+          </p:txBody>
+        </p:sp>
+        <p:sp>
+          <p:nvSpPr>
+            <p:cNvPr id="21" name="TextBox 20">
+              <a:extLst>
+                <a:ext uri="{FF2B5EF4-FFF2-40B4-BE49-F238E27FC236}">
+                  <a16:creationId xmlns:a16="http://schemas.microsoft.com/office/drawing/2014/main" id="{78E02DA3-6FF0-481D-B805-4C63216855DB}"/>
+                </a:ext>
+              </a:extLst>
+            </p:cNvPr>
+            <p:cNvSpPr txBox="1"/>
+            <p:nvPr/>
+          </p:nvSpPr>
+          <p:spPr>
+            <a:xfrm>
+              <a:off x="773212" y="1276818"/>
+              <a:ext cx="395925" cy="369332"/>
+            </a:xfrm>
+            <a:prstGeom prst="rect">
+              <a:avLst/>
+            </a:prstGeom>
+            <a:solidFill>
+              <a:schemeClr val="bg1"/>
+            </a:solidFill>
+            <a:ln w="38100">
+              <a:solidFill>
+                <a:srgbClr val="9148C8"/>
+              </a:solidFill>
+            </a:ln>
+          </p:spPr>
+          <p:txBody>
+            <a:bodyPr wrap="square" rtlCol="0">
+              <a:spAutoFit/>
+            </a:bodyPr>
+            <a:lstStyle/>
+            <a:p>
+              <a:pPr algn="ctr"/>
+              <a:r>
+                <a:rPr lang="en-SG" b="1" dirty="0"/>
+                <a:t>5</a:t>
+              </a:r>
+            </a:p>
+          </p:txBody>
+        </p:sp>
+      </p:grpSp>
+    </p:spTree>
+    <p:extLst>
+      <p:ext uri="{BB962C8B-B14F-4D97-AF65-F5344CB8AC3E}">
+        <p14:creationId xmlns:p14="http://schemas.microsoft.com/office/powerpoint/2010/main" val="3173292816"/>
+      </p:ext>
+    </p:extLst>
+  </p:cSld>
+  <p:clrMapOvr>
+    <a:masterClrMapping/>
+  </p:clrMapOvr>
+</p:sld>
+</file>
+
+<file path=ppt/slides/slide2.xml><?xml version="1.0" encoding="utf-8"?>
+<p:sld xmlns:a="http://schemas.openxmlformats.org/drawingml/2006/main" xmlns:r="http://schemas.openxmlformats.org/officeDocument/2006/relationships" xmlns:p="http://schemas.openxmlformats.org/presentationml/2006/main">
+  <p:cSld>
+    <p:spTree>
+      <p:nvGrpSpPr>
+        <p:cNvPr id="1" name=""/>
+        <p:cNvGrpSpPr/>
+        <p:nvPr/>
+      </p:nvGrpSpPr>
+      <p:grpSpPr>
+        <a:xfrm>
+          <a:off x="0" y="0"/>
+          <a:ext cx="0" cy="0"/>
+          <a:chOff x="0" y="0"/>
+          <a:chExt cx="0" cy="0"/>
+        </a:xfrm>
+      </p:grpSpPr>
       <p:sp>
         <p:nvSpPr>
           <p:cNvPr id="4" name="Rectangle 3">
@@ -4678,7 +5319,7 @@
 </p:sld>
 </file>
 
-<file path=ppt/slides/slide2.xml><?xml version="1.0" encoding="utf-8"?>
+<file path=ppt/slides/slide3.xml><?xml version="1.0" encoding="utf-8"?>
 <p:sld xmlns:a="http://schemas.openxmlformats.org/drawingml/2006/main" xmlns:r="http://schemas.openxmlformats.org/officeDocument/2006/relationships" xmlns:p="http://schemas.openxmlformats.org/presentationml/2006/main">
   <p:cSld>
     <p:spTree>

</xml_diff>